<commit_message>
Updated AIAA 2016 paper
</commit_message>
<xml_diff>
--- a/docs/AIAA 2016/fig/rel_coords.pptx
+++ b/docs/AIAA 2016/fig/rel_coords.pptx
@@ -243,7 +243,7 @@
           <a:p>
             <a:fld id="{BFFF8543-6E4F-D443-B448-D56526DFFFE7}" type="datetimeFigureOut">
               <a:rPr lang="en-US" smtClean="0"/>
-              <a:t>1/11/16</a:t>
+              <a:t>2/12/2016</a:t>
             </a:fld>
             <a:endParaRPr lang="en-US"/>
           </a:p>
@@ -413,7 +413,7 @@
           <a:p>
             <a:fld id="{BFFF8543-6E4F-D443-B448-D56526DFFFE7}" type="datetimeFigureOut">
               <a:rPr lang="en-US" smtClean="0"/>
-              <a:t>1/11/16</a:t>
+              <a:t>2/12/2016</a:t>
             </a:fld>
             <a:endParaRPr lang="en-US"/>
           </a:p>
@@ -593,7 +593,7 @@
           <a:p>
             <a:fld id="{BFFF8543-6E4F-D443-B448-D56526DFFFE7}" type="datetimeFigureOut">
               <a:rPr lang="en-US" smtClean="0"/>
-              <a:t>1/11/16</a:t>
+              <a:t>2/12/2016</a:t>
             </a:fld>
             <a:endParaRPr lang="en-US"/>
           </a:p>
@@ -763,7 +763,7 @@
           <a:p>
             <a:fld id="{BFFF8543-6E4F-D443-B448-D56526DFFFE7}" type="datetimeFigureOut">
               <a:rPr lang="en-US" smtClean="0"/>
-              <a:t>1/11/16</a:t>
+              <a:t>2/12/2016</a:t>
             </a:fld>
             <a:endParaRPr lang="en-US"/>
           </a:p>
@@ -1007,7 +1007,7 @@
           <a:p>
             <a:fld id="{BFFF8543-6E4F-D443-B448-D56526DFFFE7}" type="datetimeFigureOut">
               <a:rPr lang="en-US" smtClean="0"/>
-              <a:t>1/11/16</a:t>
+              <a:t>2/12/2016</a:t>
             </a:fld>
             <a:endParaRPr lang="en-US"/>
           </a:p>
@@ -1239,7 +1239,7 @@
           <a:p>
             <a:fld id="{BFFF8543-6E4F-D443-B448-D56526DFFFE7}" type="datetimeFigureOut">
               <a:rPr lang="en-US" smtClean="0"/>
-              <a:t>1/11/16</a:t>
+              <a:t>2/12/2016</a:t>
             </a:fld>
             <a:endParaRPr lang="en-US"/>
           </a:p>
@@ -1606,7 +1606,7 @@
           <a:p>
             <a:fld id="{BFFF8543-6E4F-D443-B448-D56526DFFFE7}" type="datetimeFigureOut">
               <a:rPr lang="en-US" smtClean="0"/>
-              <a:t>1/11/16</a:t>
+              <a:t>2/12/2016</a:t>
             </a:fld>
             <a:endParaRPr lang="en-US"/>
           </a:p>
@@ -1724,7 +1724,7 @@
           <a:p>
             <a:fld id="{BFFF8543-6E4F-D443-B448-D56526DFFFE7}" type="datetimeFigureOut">
               <a:rPr lang="en-US" smtClean="0"/>
-              <a:t>1/11/16</a:t>
+              <a:t>2/12/2016</a:t>
             </a:fld>
             <a:endParaRPr lang="en-US"/>
           </a:p>
@@ -1819,7 +1819,7 @@
           <a:p>
             <a:fld id="{BFFF8543-6E4F-D443-B448-D56526DFFFE7}" type="datetimeFigureOut">
               <a:rPr lang="en-US" smtClean="0"/>
-              <a:t>1/11/16</a:t>
+              <a:t>2/12/2016</a:t>
             </a:fld>
             <a:endParaRPr lang="en-US"/>
           </a:p>
@@ -2096,7 +2096,7 @@
           <a:p>
             <a:fld id="{BFFF8543-6E4F-D443-B448-D56526DFFFE7}" type="datetimeFigureOut">
               <a:rPr lang="en-US" smtClean="0"/>
-              <a:t>1/11/16</a:t>
+              <a:t>2/12/2016</a:t>
             </a:fld>
             <a:endParaRPr lang="en-US"/>
           </a:p>
@@ -2353,7 +2353,7 @@
           <a:p>
             <a:fld id="{BFFF8543-6E4F-D443-B448-D56526DFFFE7}" type="datetimeFigureOut">
               <a:rPr lang="en-US" smtClean="0"/>
-              <a:t>1/11/16</a:t>
+              <a:t>2/12/2016</a:t>
             </a:fld>
             <a:endParaRPr lang="en-US"/>
           </a:p>
@@ -2566,7 +2566,7 @@
           <a:p>
             <a:fld id="{BFFF8543-6E4F-D443-B448-D56526DFFFE7}" type="datetimeFigureOut">
               <a:rPr lang="en-US" smtClean="0"/>
-              <a:t>1/11/16</a:t>
+              <a:t>2/12/2016</a:t>
             </a:fld>
             <a:endParaRPr lang="en-US"/>
           </a:p>
@@ -3085,7 +3085,7 @@
         </p:nvSpPr>
         <p:spPr>
           <a:xfrm>
-            <a:off x="3749358" y="0"/>
+            <a:off x="3739084" y="10274"/>
             <a:ext cx="182880" cy="182880"/>
           </a:xfrm>
           <a:prstGeom prst="ellipse">
@@ -3128,7 +3128,7 @@
             <p:spPr>
               <a:xfrm>
                 <a:off x="2433579" y="3427371"/>
-                <a:ext cx="437684" cy="338554"/>
+                <a:ext cx="551433" cy="349326"/>
               </a:xfrm>
               <a:prstGeom prst="rect">
                 <a:avLst/>
@@ -3152,7 +3152,7 @@
                         <m:sSubPr>
                           <m:ctrlPr>
                             <a:rPr lang="en-US" sz="1600" b="0" i="1" smtClean="0">
-                              <a:latin typeface="Cambria Math" charset="0"/>
+                              <a:latin typeface="Cambria Math" panose="02040503050406030204" pitchFamily="18" charset="0"/>
                             </a:rPr>
                           </m:ctrlPr>
                         </m:sSubPr>
@@ -3170,6 +3170,18 @@
                               <a:latin typeface="Cambria Math" charset="0"/>
                             </a:rPr>
                             <m:t>𝑥</m:t>
+                          </m:r>
+                          <m:r>
+                            <a:rPr lang="en-US" sz="1600" b="0" i="1" smtClean="0">
+                              <a:latin typeface="Cambria Math" panose="02040503050406030204" pitchFamily="18" charset="0"/>
+                            </a:rPr>
+                            <m:t>,</m:t>
+                          </m:r>
+                          <m:r>
+                            <a:rPr lang="en-US" sz="1600" b="0" i="1" smtClean="0">
+                              <a:latin typeface="Cambria Math" panose="02040503050406030204" pitchFamily="18" charset="0"/>
+                            </a:rPr>
+                            <m:t>𝑟</m:t>
                           </m:r>
                         </m:sub>
                       </m:sSub>
@@ -3193,15 +3205,15 @@
             <p:spPr>
               <a:xfrm>
                 <a:off x="2433579" y="3427371"/>
-                <a:ext cx="437684" cy="338554"/>
+                <a:ext cx="551433" cy="349326"/>
               </a:xfrm>
               <a:prstGeom prst="rect">
                 <a:avLst/>
               </a:prstGeom>
-              <a:blipFill rotWithShape="0">
+              <a:blipFill>
                 <a:blip r:embed="rId2"/>
                 <a:stretch>
-                  <a:fillRect b="-3571"/>
+                  <a:fillRect b="-1724"/>
                 </a:stretch>
               </a:blipFill>
             </p:spPr>
@@ -3220,8 +3232,8 @@
           </p:sp>
         </mc:Fallback>
       </mc:AlternateContent>
-      <mc:AlternateContent xmlns:mc="http://schemas.openxmlformats.org/markup-compatibility/2006">
-        <mc:Choice xmlns:a14="http://schemas.microsoft.com/office/drawing/2010/main" Requires="a14">
+      <mc:AlternateContent xmlns:mc="http://schemas.openxmlformats.org/markup-compatibility/2006" xmlns:a14="http://schemas.microsoft.com/office/drawing/2010/main">
+        <mc:Choice Requires="a14">
           <p:sp>
             <p:nvSpPr>
               <p:cNvPr id="51" name="TextBox 50"/>
@@ -3255,7 +3267,7 @@
                         <m:sSubPr>
                           <m:ctrlPr>
                             <a:rPr lang="en-US" sz="1600" b="0" i="1" smtClean="0">
-                              <a:latin typeface="Cambria Math" charset="0"/>
+                              <a:latin typeface="Cambria Math" panose="02040503050406030204" pitchFamily="18" charset="0"/>
                             </a:rPr>
                           </m:ctrlPr>
                         </m:sSubPr>
@@ -3284,7 +3296,7 @@
             </p:txBody>
           </p:sp>
         </mc:Choice>
-        <mc:Fallback>
+        <mc:Fallback xmlns="">
           <p:sp>
             <p:nvSpPr>
               <p:cNvPr id="51" name="TextBox 50"/>
@@ -3323,8 +3335,8 @@
           </p:sp>
         </mc:Fallback>
       </mc:AlternateContent>
-      <mc:AlternateContent xmlns:mc="http://schemas.openxmlformats.org/markup-compatibility/2006">
-        <mc:Choice xmlns:a14="http://schemas.microsoft.com/office/drawing/2010/main" Requires="a14">
+      <mc:AlternateContent xmlns:mc="http://schemas.openxmlformats.org/markup-compatibility/2006" xmlns:a14="http://schemas.microsoft.com/office/drawing/2010/main">
+        <mc:Choice Requires="a14">
           <p:sp>
             <p:nvSpPr>
               <p:cNvPr id="52" name="TextBox 51"/>
@@ -3358,7 +3370,7 @@
                         <m:sSubPr>
                           <m:ctrlPr>
                             <a:rPr lang="en-US" sz="1600" b="0" i="1" smtClean="0">
-                              <a:latin typeface="Cambria Math" charset="0"/>
+                              <a:latin typeface="Cambria Math" panose="02040503050406030204" pitchFamily="18" charset="0"/>
                             </a:rPr>
                           </m:ctrlPr>
                         </m:sSubPr>
@@ -3387,7 +3399,7 @@
             </p:txBody>
           </p:sp>
         </mc:Choice>
-        <mc:Fallback>
+        <mc:Fallback xmlns="">
           <p:sp>
             <p:nvSpPr>
               <p:cNvPr id="52" name="TextBox 51"/>
@@ -3436,8 +3448,8 @@
             </p:nvSpPr>
             <p:spPr>
               <a:xfrm>
-                <a:off x="77625" y="1097281"/>
-                <a:ext cx="443711" cy="357983"/>
+                <a:off x="-16703" y="999676"/>
+                <a:ext cx="557460" cy="357983"/>
               </a:xfrm>
               <a:prstGeom prst="rect">
                 <a:avLst/>
@@ -3461,7 +3473,7 @@
                         <m:sSubPr>
                           <m:ctrlPr>
                             <a:rPr lang="en-US" sz="1600" b="0" i="1" smtClean="0">
-                              <a:latin typeface="Cambria Math" charset="0"/>
+                              <a:latin typeface="Cambria Math" panose="02040503050406030204" pitchFamily="18" charset="0"/>
                             </a:rPr>
                           </m:ctrlPr>
                         </m:sSubPr>
@@ -3479,6 +3491,18 @@
                               <a:latin typeface="Cambria Math" charset="0"/>
                             </a:rPr>
                             <m:t>𝑦</m:t>
+                          </m:r>
+                          <m:r>
+                            <a:rPr lang="en-US" sz="1600" b="0" i="1" smtClean="0">
+                              <a:latin typeface="Cambria Math" panose="02040503050406030204" pitchFamily="18" charset="0"/>
+                            </a:rPr>
+                            <m:t>,</m:t>
+                          </m:r>
+                          <m:r>
+                            <a:rPr lang="en-US" sz="1600" b="0" i="1" smtClean="0">
+                              <a:latin typeface="Cambria Math" panose="02040503050406030204" pitchFamily="18" charset="0"/>
+                            </a:rPr>
+                            <m:t>𝑟</m:t>
                           </m:r>
                         </m:sub>
                       </m:sSub>
@@ -3501,13 +3525,13 @@
             </p:nvSpPr>
             <p:spPr>
               <a:xfrm>
-                <a:off x="77625" y="1097281"/>
-                <a:ext cx="443711" cy="357983"/>
+                <a:off x="-16703" y="999676"/>
+                <a:ext cx="557460" cy="357983"/>
               </a:xfrm>
               <a:prstGeom prst="rect">
                 <a:avLst/>
               </a:prstGeom>
-              <a:blipFill rotWithShape="0">
+              <a:blipFill>
                 <a:blip r:embed="rId5"/>
                 <a:stretch>
                   <a:fillRect b="-1695"/>

</xml_diff>